<commit_message>
Add if statement part and modify 1. 딥러닝의 역사.pptx
</commit_message>
<xml_diff>
--- a/ppt/1. 딥러닝의 역사.pptx
+++ b/ppt/1. 딥러닝의 역사.pptx
@@ -263,7 +263,7 @@
           <a:p>
             <a:fld id="{4A61891F-26D4-4EED-9BA8-111B4F671ED2}" type="datetimeFigureOut">
               <a:rPr lang="ko-KR" altLang="en-US" smtClean="0"/>
-              <a:t>2017-07-20</a:t>
+              <a:t>2017-07-24</a:t>
             </a:fld>
             <a:endParaRPr lang="ko-KR" altLang="en-US"/>
           </a:p>
@@ -550,7 +550,7 @@
           <a:p>
             <a:fld id="{4A61891F-26D4-4EED-9BA8-111B4F671ED2}" type="datetimeFigureOut">
               <a:rPr lang="ko-KR" altLang="en-US" smtClean="0"/>
-              <a:t>2017-07-20</a:t>
+              <a:t>2017-07-24</a:t>
             </a:fld>
             <a:endParaRPr lang="ko-KR" altLang="en-US"/>
           </a:p>
@@ -742,7 +742,7 @@
           <a:p>
             <a:fld id="{4A61891F-26D4-4EED-9BA8-111B4F671ED2}" type="datetimeFigureOut">
               <a:rPr lang="ko-KR" altLang="en-US" smtClean="0"/>
-              <a:t>2017-07-20</a:t>
+              <a:t>2017-07-24</a:t>
             </a:fld>
             <a:endParaRPr lang="ko-KR" altLang="en-US"/>
           </a:p>
@@ -1003,7 +1003,7 @@
           <a:p>
             <a:fld id="{4A61891F-26D4-4EED-9BA8-111B4F671ED2}" type="datetimeFigureOut">
               <a:rPr lang="ko-KR" altLang="en-US" smtClean="0"/>
-              <a:t>2017-07-20</a:t>
+              <a:t>2017-07-24</a:t>
             </a:fld>
             <a:endParaRPr lang="ko-KR" altLang="en-US"/>
           </a:p>
@@ -1427,7 +1427,7 @@
           <a:p>
             <a:fld id="{4A61891F-26D4-4EED-9BA8-111B4F671ED2}" type="datetimeFigureOut">
               <a:rPr lang="ko-KR" altLang="en-US" smtClean="0"/>
-              <a:t>2017-07-20</a:t>
+              <a:t>2017-07-24</a:t>
             </a:fld>
             <a:endParaRPr lang="ko-KR" altLang="en-US"/>
           </a:p>
@@ -1973,7 +1973,7 @@
           <a:p>
             <a:fld id="{4A61891F-26D4-4EED-9BA8-111B4F671ED2}" type="datetimeFigureOut">
               <a:rPr lang="ko-KR" altLang="en-US" smtClean="0"/>
-              <a:t>2017-07-20</a:t>
+              <a:t>2017-07-24</a:t>
             </a:fld>
             <a:endParaRPr lang="ko-KR" altLang="en-US"/>
           </a:p>
@@ -2813,7 +2813,7 @@
           <a:p>
             <a:fld id="{4A61891F-26D4-4EED-9BA8-111B4F671ED2}" type="datetimeFigureOut">
               <a:rPr lang="ko-KR" altLang="en-US" smtClean="0"/>
-              <a:t>2017-07-20</a:t>
+              <a:t>2017-07-24</a:t>
             </a:fld>
             <a:endParaRPr lang="ko-KR" altLang="en-US"/>
           </a:p>
@@ -2983,7 +2983,7 @@
           <a:p>
             <a:fld id="{4A61891F-26D4-4EED-9BA8-111B4F671ED2}" type="datetimeFigureOut">
               <a:rPr lang="ko-KR" altLang="en-US" smtClean="0"/>
-              <a:t>2017-07-20</a:t>
+              <a:t>2017-07-24</a:t>
             </a:fld>
             <a:endParaRPr lang="ko-KR" altLang="en-US"/>
           </a:p>
@@ -3167,7 +3167,7 @@
           <a:p>
             <a:fld id="{4A61891F-26D4-4EED-9BA8-111B4F671ED2}" type="datetimeFigureOut">
               <a:rPr lang="ko-KR" altLang="en-US" smtClean="0"/>
-              <a:t>2017-07-20</a:t>
+              <a:t>2017-07-24</a:t>
             </a:fld>
             <a:endParaRPr lang="ko-KR" altLang="en-US"/>
           </a:p>
@@ -3337,7 +3337,7 @@
           <a:p>
             <a:fld id="{4A61891F-26D4-4EED-9BA8-111B4F671ED2}" type="datetimeFigureOut">
               <a:rPr lang="ko-KR" altLang="en-US" smtClean="0"/>
-              <a:t>2017-07-20</a:t>
+              <a:t>2017-07-24</a:t>
             </a:fld>
             <a:endParaRPr lang="ko-KR" altLang="en-US"/>
           </a:p>
@@ -3585,7 +3585,7 @@
           <a:p>
             <a:fld id="{4A61891F-26D4-4EED-9BA8-111B4F671ED2}" type="datetimeFigureOut">
               <a:rPr lang="ko-KR" altLang="en-US" smtClean="0"/>
-              <a:t>2017-07-20</a:t>
+              <a:t>2017-07-24</a:t>
             </a:fld>
             <a:endParaRPr lang="ko-KR" altLang="en-US"/>
           </a:p>
@@ -3822,7 +3822,7 @@
           <a:p>
             <a:fld id="{4A61891F-26D4-4EED-9BA8-111B4F671ED2}" type="datetimeFigureOut">
               <a:rPr lang="ko-KR" altLang="en-US" smtClean="0"/>
-              <a:t>2017-07-20</a:t>
+              <a:t>2017-07-24</a:t>
             </a:fld>
             <a:endParaRPr lang="ko-KR" altLang="en-US"/>
           </a:p>
@@ -4195,7 +4195,7 @@
           <a:p>
             <a:fld id="{4A61891F-26D4-4EED-9BA8-111B4F671ED2}" type="datetimeFigureOut">
               <a:rPr lang="ko-KR" altLang="en-US" smtClean="0"/>
-              <a:t>2017-07-20</a:t>
+              <a:t>2017-07-24</a:t>
             </a:fld>
             <a:endParaRPr lang="ko-KR" altLang="en-US"/>
           </a:p>
@@ -4313,7 +4313,7 @@
           <a:p>
             <a:fld id="{4A61891F-26D4-4EED-9BA8-111B4F671ED2}" type="datetimeFigureOut">
               <a:rPr lang="ko-KR" altLang="en-US" smtClean="0"/>
-              <a:t>2017-07-20</a:t>
+              <a:t>2017-07-24</a:t>
             </a:fld>
             <a:endParaRPr lang="ko-KR" altLang="en-US"/>
           </a:p>
@@ -4408,7 +4408,7 @@
           <a:p>
             <a:fld id="{4A61891F-26D4-4EED-9BA8-111B4F671ED2}" type="datetimeFigureOut">
               <a:rPr lang="ko-KR" altLang="en-US" smtClean="0"/>
-              <a:t>2017-07-20</a:t>
+              <a:t>2017-07-24</a:t>
             </a:fld>
             <a:endParaRPr lang="ko-KR" altLang="en-US"/>
           </a:p>
@@ -4659,7 +4659,7 @@
           <a:p>
             <a:fld id="{4A61891F-26D4-4EED-9BA8-111B4F671ED2}" type="datetimeFigureOut">
               <a:rPr lang="ko-KR" altLang="en-US" smtClean="0"/>
-              <a:t>2017-07-20</a:t>
+              <a:t>2017-07-24</a:t>
             </a:fld>
             <a:endParaRPr lang="ko-KR" altLang="en-US"/>
           </a:p>
@@ -4946,7 +4946,7 @@
           <a:p>
             <a:fld id="{4A61891F-26D4-4EED-9BA8-111B4F671ED2}" type="datetimeFigureOut">
               <a:rPr lang="ko-KR" altLang="en-US" smtClean="0"/>
-              <a:t>2017-07-20</a:t>
+              <a:t>2017-07-24</a:t>
             </a:fld>
             <a:endParaRPr lang="ko-KR" altLang="en-US"/>
           </a:p>
@@ -5159,7 +5159,7 @@
           <a:p>
             <a:fld id="{4A61891F-26D4-4EED-9BA8-111B4F671ED2}" type="datetimeFigureOut">
               <a:rPr lang="ko-KR" altLang="en-US" smtClean="0"/>
-              <a:t>2017-07-20</a:t>
+              <a:t>2017-07-24</a:t>
             </a:fld>
             <a:endParaRPr lang="ko-KR" altLang="en-US"/>
           </a:p>

</xml_diff>